<commit_message>
on fait moins le malin la
</commit_message>
<xml_diff>
--- a/livrables/Oral/Presentation_Tim.pptx
+++ b/livrables/Oral/Presentation_Tim.pptx
@@ -207,7 +207,7 @@
             <a:fld id="{ACE0A8D2-FD27-4D4F-B639-792037EA8B5A}" type="datetimeFigureOut">
               <a:rPr lang="fr-FR" smtClean="0"/>
               <a:pPr/>
-              <a:t>12/06/2017</a:t>
+              <a:t>13/06/2017</a:t>
             </a:fld>
             <a:endParaRPr lang="fr-FR" dirty="0"/>
           </a:p>
@@ -699,7 +699,7 @@
             <a:fld id="{63061A50-F5F5-4901-9E64-6355DCF45617}" type="datetimeFigureOut">
               <a:rPr lang="fr-FR" smtClean="0"/>
               <a:pPr/>
-              <a:t>12/06/2017</a:t>
+              <a:t>13/06/2017</a:t>
             </a:fld>
             <a:endParaRPr lang="fr-FR" dirty="0"/>
           </a:p>
@@ -1060,7 +1060,7 @@
             <a:fld id="{63061A50-F5F5-4901-9E64-6355DCF45617}" type="datetimeFigureOut">
               <a:rPr lang="fr-FR" smtClean="0"/>
               <a:pPr/>
-              <a:t>12/06/2017</a:t>
+              <a:t>13/06/2017</a:t>
             </a:fld>
             <a:endParaRPr lang="fr-FR" dirty="0"/>
           </a:p>
@@ -1237,7 +1237,7 @@
             <a:fld id="{63061A50-F5F5-4901-9E64-6355DCF45617}" type="datetimeFigureOut">
               <a:rPr lang="fr-FR" smtClean="0"/>
               <a:pPr/>
-              <a:t>12/06/2017</a:t>
+              <a:t>13/06/2017</a:t>
             </a:fld>
             <a:endParaRPr lang="fr-FR" dirty="0"/>
           </a:p>
@@ -1474,7 +1474,7 @@
             <a:fld id="{63061A50-F5F5-4901-9E64-6355DCF45617}" type="datetimeFigureOut">
               <a:rPr lang="fr-FR" smtClean="0"/>
               <a:pPr/>
-              <a:t>12/06/2017</a:t>
+              <a:t>13/06/2017</a:t>
             </a:fld>
             <a:endParaRPr lang="fr-FR" dirty="0"/>
           </a:p>
@@ -1745,7 +1745,7 @@
             <a:fld id="{63061A50-F5F5-4901-9E64-6355DCF45617}" type="datetimeFigureOut">
               <a:rPr lang="fr-FR" smtClean="0"/>
               <a:pPr/>
-              <a:t>12/06/2017</a:t>
+              <a:t>13/06/2017</a:t>
             </a:fld>
             <a:endParaRPr lang="fr-FR" dirty="0"/>
           </a:p>
@@ -1967,7 +1967,7 @@
             <a:fld id="{63061A50-F5F5-4901-9E64-6355DCF45617}" type="datetimeFigureOut">
               <a:rPr lang="fr-FR" smtClean="0"/>
               <a:pPr/>
-              <a:t>12/06/2017</a:t>
+              <a:t>13/06/2017</a:t>
             </a:fld>
             <a:endParaRPr lang="fr-FR" dirty="0"/>
           </a:p>
@@ -2321,7 +2321,7 @@
             <a:fld id="{63061A50-F5F5-4901-9E64-6355DCF45617}" type="datetimeFigureOut">
               <a:rPr lang="fr-FR" smtClean="0"/>
               <a:pPr/>
-              <a:t>12/06/2017</a:t>
+              <a:t>13/06/2017</a:t>
             </a:fld>
             <a:endParaRPr lang="fr-FR" dirty="0"/>
           </a:p>
@@ -2555,7 +2555,7 @@
             <a:fld id="{63061A50-F5F5-4901-9E64-6355DCF45617}" type="datetimeFigureOut">
               <a:rPr lang="fr-FR" smtClean="0"/>
               <a:pPr/>
-              <a:t>12/06/2017</a:t>
+              <a:t>13/06/2017</a:t>
             </a:fld>
             <a:endParaRPr lang="fr-FR" dirty="0"/>
           </a:p>
@@ -2697,7 +2697,7 @@
             <a:fld id="{63061A50-F5F5-4901-9E64-6355DCF45617}" type="datetimeFigureOut">
               <a:rPr lang="fr-FR" smtClean="0"/>
               <a:pPr/>
-              <a:t>12/06/2017</a:t>
+              <a:t>13/06/2017</a:t>
             </a:fld>
             <a:endParaRPr lang="fr-FR" dirty="0"/>
           </a:p>
@@ -2976,7 +2976,7 @@
             <a:fld id="{63061A50-F5F5-4901-9E64-6355DCF45617}" type="datetimeFigureOut">
               <a:rPr lang="fr-FR" smtClean="0"/>
               <a:pPr/>
-              <a:t>12/06/2017</a:t>
+              <a:t>13/06/2017</a:t>
             </a:fld>
             <a:endParaRPr lang="fr-FR" dirty="0"/>
           </a:p>
@@ -3385,7 +3385,7 @@
             <a:fld id="{63061A50-F5F5-4901-9E64-6355DCF45617}" type="datetimeFigureOut">
               <a:rPr lang="fr-FR" smtClean="0"/>
               <a:pPr/>
-              <a:t>12/06/2017</a:t>
+              <a:t>13/06/2017</a:t>
             </a:fld>
             <a:endParaRPr lang="fr-FR" dirty="0"/>
           </a:p>
@@ -3725,7 +3725,7 @@
             <a:fld id="{63061A50-F5F5-4901-9E64-6355DCF45617}" type="datetimeFigureOut">
               <a:rPr lang="fr-FR" smtClean="0"/>
               <a:pPr/>
-              <a:t>12/06/2017</a:t>
+              <a:t>13/06/2017</a:t>
             </a:fld>
             <a:endParaRPr lang="fr-FR" dirty="0"/>
           </a:p>
@@ -4490,16 +4490,190 @@
             <a:endParaRPr lang="fr-FR" dirty="0" smtClean="0"/>
           </a:p>
           <a:p>
+            <a:pPr>
+              <a:buNone/>
+            </a:pPr>
             <a:endParaRPr lang="fr-FR" dirty="0" smtClean="0"/>
           </a:p>
           <a:p>
             <a:endParaRPr lang="fr-FR" dirty="0" smtClean="0"/>
           </a:p>
           <a:p>
+            <a:endParaRPr lang="fr-FR" dirty="0" smtClean="0"/>
+          </a:p>
+          <a:p>
             <a:r>
               <a:rPr lang="fr-FR" dirty="0" smtClean="0"/>
-              <a:t>Une méthode de contours</a:t>
-            </a:r>
+              <a:t>Une méthode de </a:t>
+            </a:r>
+            <a:r>
+              <a:rPr lang="fr-FR" dirty="0" smtClean="0"/>
+              <a:t>contours</a:t>
+            </a:r>
+          </a:p>
+          <a:p>
+            <a:pPr lvl="1"/>
+            <a:r>
+              <a:rPr lang="fr-FR" dirty="0" smtClean="0"/>
+              <a:t>Les motifs ne sont </a:t>
+            </a:r>
+            <a:r>
+              <a:rPr lang="fr-FR" smtClean="0"/>
+              <a:t>pas utilisés</a:t>
+            </a:r>
+            <a:endParaRPr lang="fr-FR" dirty="0" smtClean="0"/>
+          </a:p>
+        </p:txBody>
+      </p:sp>
+      <p:pic>
+        <p:nvPicPr>
+          <p:cNvPr id="4" name="Image 3" descr="ScanActif.jpg"/>
+          <p:cNvPicPr>
+            <a:picLocks noChangeAspect="1"/>
+          </p:cNvPicPr>
+          <p:nvPr/>
+        </p:nvPicPr>
+        <p:blipFill>
+          <a:blip r:embed="rId2" cstate="print"/>
+          <a:stretch>
+            <a:fillRect/>
+          </a:stretch>
+        </p:blipFill>
+        <p:spPr>
+          <a:xfrm>
+            <a:off x="1547664" y="1772816"/>
+            <a:ext cx="1871477" cy="1440160"/>
+          </a:xfrm>
+          <a:prstGeom prst="rect">
+            <a:avLst/>
+          </a:prstGeom>
+          <a:ln>
+            <a:solidFill>
+              <a:schemeClr val="bg1">
+                <a:lumMod val="50000"/>
+              </a:schemeClr>
+            </a:solidFill>
+          </a:ln>
+        </p:spPr>
+      </p:pic>
+      <p:sp>
+        <p:nvSpPr>
+          <p:cNvPr id="5" name="ZoneTexte 4"/>
+          <p:cNvSpPr txBox="1"/>
+          <p:nvPr/>
+        </p:nvSpPr>
+        <p:spPr>
+          <a:xfrm>
+            <a:off x="1619672" y="3212976"/>
+            <a:ext cx="1619546" cy="369332"/>
+          </a:xfrm>
+          <a:prstGeom prst="rect">
+            <a:avLst/>
+          </a:prstGeom>
+          <a:noFill/>
+        </p:spPr>
+        <p:txBody>
+          <a:bodyPr wrap="none" rtlCol="0">
+            <a:spAutoFit/>
+          </a:bodyPr>
+          <a:lstStyle/>
+          <a:p>
+            <a:r>
+              <a:rPr lang="fr-FR" dirty="0" smtClean="0"/>
+              <a:t>Méthode active</a:t>
+            </a:r>
+            <a:endParaRPr lang="fr-FR" dirty="0"/>
+          </a:p>
+        </p:txBody>
+      </p:sp>
+      <p:sp>
+        <p:nvSpPr>
+          <p:cNvPr id="9" name="ZoneTexte 8"/>
+          <p:cNvSpPr txBox="1"/>
+          <p:nvPr/>
+        </p:nvSpPr>
+        <p:spPr>
+          <a:xfrm>
+            <a:off x="4005868" y="1772816"/>
+            <a:ext cx="843501" cy="1446550"/>
+          </a:xfrm>
+          <a:prstGeom prst="rect">
+            <a:avLst/>
+          </a:prstGeom>
+          <a:noFill/>
+        </p:spPr>
+        <p:txBody>
+          <a:bodyPr wrap="none" rtlCol="0">
+            <a:spAutoFit/>
+          </a:bodyPr>
+          <a:lstStyle/>
+          <a:p>
+            <a:r>
+              <a:rPr lang="fr-FR" sz="8800" dirty="0" smtClean="0"/>
+              <a:t>≠</a:t>
+            </a:r>
+            <a:endParaRPr lang="fr-FR" sz="8800" dirty="0"/>
+          </a:p>
+        </p:txBody>
+      </p:sp>
+      <p:pic>
+        <p:nvPicPr>
+          <p:cNvPr id="10" name="Image 9" descr="camera.jpg"/>
+          <p:cNvPicPr>
+            <a:picLocks noChangeAspect="1"/>
+          </p:cNvPicPr>
+          <p:nvPr/>
+        </p:nvPicPr>
+        <p:blipFill>
+          <a:blip r:embed="rId3" cstate="print"/>
+          <a:stretch>
+            <a:fillRect/>
+          </a:stretch>
+        </p:blipFill>
+        <p:spPr>
+          <a:xfrm>
+            <a:off x="5436096" y="1772816"/>
+            <a:ext cx="1623450" cy="1440000"/>
+          </a:xfrm>
+          <a:prstGeom prst="rect">
+            <a:avLst/>
+          </a:prstGeom>
+          <a:ln>
+            <a:solidFill>
+              <a:schemeClr val="bg1">
+                <a:lumMod val="50000"/>
+              </a:schemeClr>
+            </a:solidFill>
+          </a:ln>
+        </p:spPr>
+      </p:pic>
+      <p:sp>
+        <p:nvSpPr>
+          <p:cNvPr id="11" name="ZoneTexte 10"/>
+          <p:cNvSpPr txBox="1"/>
+          <p:nvPr/>
+        </p:nvSpPr>
+        <p:spPr>
+          <a:xfrm>
+            <a:off x="5364088" y="3212976"/>
+            <a:ext cx="1733360" cy="369332"/>
+          </a:xfrm>
+          <a:prstGeom prst="rect">
+            <a:avLst/>
+          </a:prstGeom>
+          <a:noFill/>
+        </p:spPr>
+        <p:txBody>
+          <a:bodyPr wrap="none" rtlCol="0">
+            <a:spAutoFit/>
+          </a:bodyPr>
+          <a:lstStyle/>
+          <a:p>
+            <a:r>
+              <a:rPr lang="fr-FR" dirty="0" smtClean="0"/>
+              <a:t>Méthode passive</a:t>
+            </a:r>
+            <a:endParaRPr lang="fr-FR" dirty="0"/>
           </a:p>
         </p:txBody>
       </p:sp>
@@ -4643,7 +4817,7 @@
         </p:blipFill>
         <p:spPr>
           <a:xfrm>
-            <a:off x="3707904" y="4653136"/>
+            <a:off x="3779912" y="4653136"/>
             <a:ext cx="1728000" cy="1296000"/>
           </a:xfrm>
           <a:prstGeom prst="rect">
@@ -4674,7 +4848,7 @@
         </p:blipFill>
         <p:spPr>
           <a:xfrm>
-            <a:off x="3707904" y="2636912"/>
+            <a:off x="3779913" y="2636912"/>
             <a:ext cx="1728192" cy="1296144"/>
           </a:xfrm>
           <a:prstGeom prst="rect">
@@ -4790,8 +4964,8 @@
         </p:nvSpPr>
         <p:spPr>
           <a:xfrm>
-            <a:off x="2843808" y="3068960"/>
-            <a:ext cx="792088" cy="432048"/>
+            <a:off x="2879813" y="3068960"/>
+            <a:ext cx="792088" cy="360000"/>
           </a:xfrm>
           <a:prstGeom prst="rightArrow">
             <a:avLst/>
@@ -4830,8 +5004,8 @@
         </p:nvSpPr>
         <p:spPr>
           <a:xfrm>
-            <a:off x="5580112" y="3068960"/>
-            <a:ext cx="792088" cy="432048"/>
+            <a:off x="5616117" y="3068960"/>
+            <a:ext cx="792088" cy="360000"/>
           </a:xfrm>
           <a:prstGeom prst="rightArrow">
             <a:avLst/>
@@ -4870,8 +5044,8 @@
         </p:nvSpPr>
         <p:spPr>
           <a:xfrm>
-            <a:off x="2843808" y="5013176"/>
-            <a:ext cx="792088" cy="432048"/>
+            <a:off x="2879716" y="5085184"/>
+            <a:ext cx="792088" cy="360000"/>
           </a:xfrm>
           <a:prstGeom prst="rightArrow">
             <a:avLst/>
@@ -4910,8 +5084,8 @@
         </p:nvSpPr>
         <p:spPr>
           <a:xfrm>
-            <a:off x="5580112" y="5085184"/>
-            <a:ext cx="792088" cy="432048"/>
+            <a:off x="5616020" y="5085184"/>
+            <a:ext cx="792088" cy="360000"/>
           </a:xfrm>
           <a:prstGeom prst="rightArrow">
             <a:avLst/>
@@ -5070,7 +5244,7 @@
         </p:nvSpPr>
         <p:spPr>
           <a:xfrm>
-            <a:off x="4427984" y="5517232"/>
+            <a:off x="4499992" y="5517232"/>
             <a:ext cx="1584176" cy="307777"/>
           </a:xfrm>
           <a:prstGeom prst="rect">
@@ -5455,79 +5629,6 @@
           <a:chExt cx="0" cy="0"/>
         </a:xfrm>
       </p:grpSpPr>
-      <p:sp>
-        <p:nvSpPr>
-          <p:cNvPr id="2" name="Titre 1"/>
-          <p:cNvSpPr>
-            <a:spLocks noGrp="1"/>
-          </p:cNvSpPr>
-          <p:nvPr>
-            <p:ph type="title"/>
-          </p:nvPr>
-        </p:nvSpPr>
-        <p:spPr/>
-        <p:txBody>
-          <a:bodyPr/>
-          <a:lstStyle/>
-          <a:p>
-            <a:r>
-              <a:rPr lang="fr-FR" dirty="0" smtClean="0"/>
-              <a:t>II. Une représentation en machine</a:t>
-            </a:r>
-            <a:endParaRPr lang="fr-FR" dirty="0"/>
-          </a:p>
-        </p:txBody>
-      </p:sp>
-      <p:sp>
-        <p:nvSpPr>
-          <p:cNvPr id="3" name="Espace réservé du contenu 2"/>
-          <p:cNvSpPr>
-            <a:spLocks noGrp="1"/>
-          </p:cNvSpPr>
-          <p:nvPr>
-            <p:ph sz="quarter" idx="1"/>
-          </p:nvPr>
-        </p:nvSpPr>
-        <p:spPr/>
-        <p:txBody>
-          <a:bodyPr/>
-          <a:lstStyle/>
-          <a:p>
-            <a:r>
-              <a:rPr lang="fr-FR" dirty="0" smtClean="0"/>
-              <a:t>Le « winged edge polyhedron »</a:t>
-            </a:r>
-          </a:p>
-          <a:p>
-            <a:r>
-              <a:rPr lang="fr-FR" dirty="0" smtClean="0"/>
-              <a:t>Stockage en mémoire dissocié:</a:t>
-            </a:r>
-          </a:p>
-          <a:p>
-            <a:pPr lvl="1"/>
-            <a:r>
-              <a:rPr lang="fr-FR" dirty="0" smtClean="0"/>
-              <a:t>Sommets : géométrie</a:t>
-            </a:r>
-          </a:p>
-          <a:p>
-            <a:pPr lvl="1"/>
-            <a:r>
-              <a:rPr lang="fr-FR" dirty="0" smtClean="0"/>
-              <a:t>Arêtes : topologie</a:t>
-            </a:r>
-          </a:p>
-          <a:p>
-            <a:pPr lvl="1"/>
-            <a:r>
-              <a:rPr lang="fr-FR" dirty="0" smtClean="0"/>
-              <a:t>Faces : Photométrie</a:t>
-            </a:r>
-            <a:endParaRPr lang="fr-FR" dirty="0"/>
-          </a:p>
-        </p:txBody>
-      </p:sp>
       <p:pic>
         <p:nvPicPr>
           <p:cNvPr id="4" name="Image 3" descr="WEP.PNG"/>
@@ -5544,7 +5645,7 @@
         </p:blipFill>
         <p:spPr>
           <a:xfrm>
-            <a:off x="4071934" y="2143116"/>
+            <a:off x="4572000" y="2420888"/>
             <a:ext cx="4214842" cy="3576564"/>
           </a:xfrm>
           <a:prstGeom prst="rect">
@@ -5552,6 +5653,92 @@
           </a:prstGeom>
         </p:spPr>
       </p:pic>
+      <p:sp>
+        <p:nvSpPr>
+          <p:cNvPr id="2" name="Titre 1"/>
+          <p:cNvSpPr>
+            <a:spLocks noGrp="1"/>
+          </p:cNvSpPr>
+          <p:nvPr>
+            <p:ph type="title"/>
+          </p:nvPr>
+        </p:nvSpPr>
+        <p:spPr/>
+        <p:txBody>
+          <a:bodyPr/>
+          <a:lstStyle/>
+          <a:p>
+            <a:r>
+              <a:rPr lang="fr-FR" dirty="0" smtClean="0"/>
+              <a:t>II. Une représentation en machine</a:t>
+            </a:r>
+            <a:endParaRPr lang="fr-FR" dirty="0"/>
+          </a:p>
+        </p:txBody>
+      </p:sp>
+      <p:sp>
+        <p:nvSpPr>
+          <p:cNvPr id="3" name="Espace réservé du contenu 2"/>
+          <p:cNvSpPr>
+            <a:spLocks noGrp="1"/>
+          </p:cNvSpPr>
+          <p:nvPr>
+            <p:ph sz="quarter" idx="1"/>
+          </p:nvPr>
+        </p:nvSpPr>
+        <p:spPr/>
+        <p:txBody>
+          <a:bodyPr/>
+          <a:lstStyle/>
+          <a:p>
+            <a:r>
+              <a:rPr lang="fr-FR" dirty="0" smtClean="0"/>
+              <a:t>Le « winged edge polyhedron </a:t>
+            </a:r>
+            <a:r>
+              <a:rPr lang="fr-FR" dirty="0" smtClean="0"/>
+              <a:t>»</a:t>
+            </a:r>
+          </a:p>
+          <a:p>
+            <a:endParaRPr lang="fr-FR" dirty="0" smtClean="0"/>
+          </a:p>
+          <a:p>
+            <a:endParaRPr lang="fr-FR" dirty="0" smtClean="0"/>
+          </a:p>
+          <a:p>
+            <a:endParaRPr lang="fr-FR" dirty="0" smtClean="0"/>
+          </a:p>
+          <a:p>
+            <a:r>
+              <a:rPr lang="fr-FR" dirty="0" smtClean="0"/>
+              <a:t>Stockage en mémoire dissocié:</a:t>
+            </a:r>
+          </a:p>
+          <a:p>
+            <a:pPr lvl="1"/>
+            <a:r>
+              <a:rPr lang="fr-FR" dirty="0" smtClean="0"/>
+              <a:t>Sommets : géométrie</a:t>
+            </a:r>
+          </a:p>
+          <a:p>
+            <a:pPr lvl="1"/>
+            <a:r>
+              <a:rPr lang="fr-FR" dirty="0" smtClean="0"/>
+              <a:t>Arêtes : topologie</a:t>
+            </a:r>
+          </a:p>
+          <a:p>
+            <a:pPr lvl="1"/>
+            <a:r>
+              <a:rPr lang="fr-FR" dirty="0" smtClean="0"/>
+              <a:t>Faces : Photométrie</a:t>
+            </a:r>
+            <a:endParaRPr lang="fr-FR" dirty="0"/>
+          </a:p>
+        </p:txBody>
+      </p:sp>
     </p:spTree>
   </p:cSld>
   <p:clrMapOvr>
@@ -5619,11 +5806,7 @@
           <a:p>
             <a:r>
               <a:rPr lang="fr-FR" dirty="0" smtClean="0"/>
-              <a:t>Trouver les points </a:t>
-            </a:r>
-            <a:r>
-              <a:rPr lang="fr-FR" dirty="0" smtClean="0"/>
-              <a:t>d’intersection</a:t>
+              <a:t>Trouver les points d’intersection</a:t>
             </a:r>
           </a:p>
           <a:p>
@@ -5639,7 +5822,26 @@
               <a:rPr lang="fr-FR" dirty="0" smtClean="0"/>
               <a:t>Test d’inclusion du point d’intersection dans la face (produits vectoriels successifs)</a:t>
             </a:r>
-            <a:endParaRPr lang="fr-FR" dirty="0" smtClean="0"/>
+          </a:p>
+          <a:p>
+            <a:r>
+              <a:rPr lang="fr-FR" dirty="0" smtClean="0"/>
+              <a:t>Reconstruire les arêtes</a:t>
+            </a:r>
+          </a:p>
+          <a:p>
+            <a:pPr lvl="1"/>
+            <a:r>
+              <a:rPr lang="fr-FR" dirty="0" smtClean="0"/>
+              <a:t>Les arêtes intérieures forment des graphes</a:t>
+            </a:r>
+          </a:p>
+          <a:p>
+            <a:pPr lvl="1"/>
+            <a:r>
+              <a:rPr lang="fr-FR" dirty="0" smtClean="0"/>
+              <a:t>Les arêtes de surface forment des boucles</a:t>
+            </a:r>
           </a:p>
           <a:p>
             <a:r>
@@ -5648,28 +5850,14 @@
             </a:r>
             <a:r>
               <a:rPr lang="fr-FR" dirty="0" smtClean="0"/>
-              <a:t>arêtes</a:t>
+              <a:t>faces</a:t>
             </a:r>
           </a:p>
           <a:p>
             <a:pPr lvl="1"/>
             <a:r>
               <a:rPr lang="fr-FR" dirty="0" smtClean="0"/>
-              <a:t>Les arêtes intérieures forment des graphes</a:t>
-            </a:r>
-          </a:p>
-          <a:p>
-            <a:pPr lvl="1"/>
-            <a:r>
-              <a:rPr lang="fr-FR" dirty="0" smtClean="0"/>
-              <a:t>Les arêtes de surface forment des boucles</a:t>
-            </a:r>
-            <a:endParaRPr lang="fr-FR" dirty="0" smtClean="0"/>
-          </a:p>
-          <a:p>
-            <a:r>
-              <a:rPr lang="fr-FR" dirty="0" smtClean="0"/>
-              <a:t>Reconstruire les faces</a:t>
+              <a:t>Itération sur les anciennes faces</a:t>
             </a:r>
             <a:endParaRPr lang="fr-FR" dirty="0"/>
           </a:p>
@@ -5757,13 +5945,8 @@
           <a:p>
             <a:r>
               <a:rPr lang="fr-FR" dirty="0" smtClean="0"/>
-              <a:t>Des choix à </a:t>
-            </a:r>
-            <a:r>
-              <a:rPr lang="fr-FR" dirty="0" smtClean="0"/>
-              <a:t>double tranchant</a:t>
-            </a:r>
-            <a:endParaRPr lang="fr-FR" dirty="0" smtClean="0"/>
+              <a:t>Des choix à double tranchant</a:t>
+            </a:r>
           </a:p>
           <a:p>
             <a:endParaRPr lang="fr-FR" dirty="0" smtClean="0"/>

</xml_diff>